<commit_message>
beast runs and weighted divergence calculations
</commit_message>
<xml_diff>
--- a/figures/figure_components/figure3.pptx
+++ b/figures/figure_components/figure3.pptx
@@ -243,7 +243,7 @@
           <a:p>
             <a:fld id="{368CC5CE-77A5-F648-895D-B56A6D348C68}" type="datetimeFigureOut">
               <a:rPr lang="en-US" smtClean="0"/>
-              <a:t>10/9/20</a:t>
+              <a:t>10/29/20</a:t>
             </a:fld>
             <a:endParaRPr lang="en-US"/>
           </a:p>
@@ -413,7 +413,7 @@
           <a:p>
             <a:fld id="{368CC5CE-77A5-F648-895D-B56A6D348C68}" type="datetimeFigureOut">
               <a:rPr lang="en-US" smtClean="0"/>
-              <a:t>10/9/20</a:t>
+              <a:t>10/29/20</a:t>
             </a:fld>
             <a:endParaRPr lang="en-US"/>
           </a:p>
@@ -593,7 +593,7 @@
           <a:p>
             <a:fld id="{368CC5CE-77A5-F648-895D-B56A6D348C68}" type="datetimeFigureOut">
               <a:rPr lang="en-US" smtClean="0"/>
-              <a:t>10/9/20</a:t>
+              <a:t>10/29/20</a:t>
             </a:fld>
             <a:endParaRPr lang="en-US"/>
           </a:p>
@@ -763,7 +763,7 @@
           <a:p>
             <a:fld id="{368CC5CE-77A5-F648-895D-B56A6D348C68}" type="datetimeFigureOut">
               <a:rPr lang="en-US" smtClean="0"/>
-              <a:t>10/9/20</a:t>
+              <a:t>10/29/20</a:t>
             </a:fld>
             <a:endParaRPr lang="en-US"/>
           </a:p>
@@ -1009,7 +1009,7 @@
           <a:p>
             <a:fld id="{368CC5CE-77A5-F648-895D-B56A6D348C68}" type="datetimeFigureOut">
               <a:rPr lang="en-US" smtClean="0"/>
-              <a:t>10/9/20</a:t>
+              <a:t>10/29/20</a:t>
             </a:fld>
             <a:endParaRPr lang="en-US"/>
           </a:p>
@@ -1241,7 +1241,7 @@
           <a:p>
             <a:fld id="{368CC5CE-77A5-F648-895D-B56A6D348C68}" type="datetimeFigureOut">
               <a:rPr lang="en-US" smtClean="0"/>
-              <a:t>10/9/20</a:t>
+              <a:t>10/29/20</a:t>
             </a:fld>
             <a:endParaRPr lang="en-US"/>
           </a:p>
@@ -1608,7 +1608,7 @@
           <a:p>
             <a:fld id="{368CC5CE-77A5-F648-895D-B56A6D348C68}" type="datetimeFigureOut">
               <a:rPr lang="en-US" smtClean="0"/>
-              <a:t>10/9/20</a:t>
+              <a:t>10/29/20</a:t>
             </a:fld>
             <a:endParaRPr lang="en-US"/>
           </a:p>
@@ -1726,7 +1726,7 @@
           <a:p>
             <a:fld id="{368CC5CE-77A5-F648-895D-B56A6D348C68}" type="datetimeFigureOut">
               <a:rPr lang="en-US" smtClean="0"/>
-              <a:t>10/9/20</a:t>
+              <a:t>10/29/20</a:t>
             </a:fld>
             <a:endParaRPr lang="en-US"/>
           </a:p>
@@ -1821,7 +1821,7 @@
           <a:p>
             <a:fld id="{368CC5CE-77A5-F648-895D-B56A6D348C68}" type="datetimeFigureOut">
               <a:rPr lang="en-US" smtClean="0"/>
-              <a:t>10/9/20</a:t>
+              <a:t>10/29/20</a:t>
             </a:fld>
             <a:endParaRPr lang="en-US"/>
           </a:p>
@@ -2098,7 +2098,7 @@
           <a:p>
             <a:fld id="{368CC5CE-77A5-F648-895D-B56A6D348C68}" type="datetimeFigureOut">
               <a:rPr lang="en-US" smtClean="0"/>
-              <a:t>10/9/20</a:t>
+              <a:t>10/29/20</a:t>
             </a:fld>
             <a:endParaRPr lang="en-US"/>
           </a:p>
@@ -2355,7 +2355,7 @@
           <a:p>
             <a:fld id="{368CC5CE-77A5-F648-895D-B56A6D348C68}" type="datetimeFigureOut">
               <a:rPr lang="en-US" smtClean="0"/>
-              <a:t>10/9/20</a:t>
+              <a:t>10/29/20</a:t>
             </a:fld>
             <a:endParaRPr lang="en-US"/>
           </a:p>
@@ -2568,7 +2568,7 @@
           <a:p>
             <a:fld id="{368CC5CE-77A5-F648-895D-B56A6D348C68}" type="datetimeFigureOut">
               <a:rPr lang="en-US" smtClean="0"/>
-              <a:t>10/9/20</a:t>
+              <a:t>10/29/20</a:t>
             </a:fld>
             <a:endParaRPr lang="en-US"/>
           </a:p>
@@ -2975,10 +2975,10 @@
       </p:grpSpPr>
       <p:pic>
         <p:nvPicPr>
-          <p:cNvPr id="6" name="Picture 5">
+          <p:cNvPr id="4" name="Picture 3">
             <a:extLst>
               <a:ext uri="{FF2B5EF4-FFF2-40B4-BE49-F238E27FC236}">
-                <a16:creationId xmlns:a16="http://schemas.microsoft.com/office/drawing/2014/main" id="{0CA18124-29D0-824D-B3B5-EAC00BC73C64}"/>
+                <a16:creationId xmlns:a16="http://schemas.microsoft.com/office/drawing/2014/main" id="{59206596-1D39-BC47-9709-B67C7C2ED452}"/>
               </a:ext>
             </a:extLst>
           </p:cNvPr>
@@ -2989,13 +2989,13 @@
         </p:nvPicPr>
         <p:blipFill rotWithShape="1">
           <a:blip r:embed="rId2"/>
-          <a:srcRect r="15979" b="50027"/>
+          <a:srcRect r="15961"/>
           <a:stretch/>
         </p:blipFill>
         <p:spPr>
           <a:xfrm>
-            <a:off x="6277597" y="177267"/>
-            <a:ext cx="5867874" cy="1863047"/>
+            <a:off x="36536" y="63310"/>
+            <a:ext cx="6164861" cy="3915955"/>
           </a:xfrm>
           <a:prstGeom prst="rect">
             <a:avLst/>
@@ -3004,39 +3004,10 @@
       </p:pic>
       <p:pic>
         <p:nvPicPr>
-          <p:cNvPr id="19" name="Picture 18">
+          <p:cNvPr id="7" name="Picture 6">
             <a:extLst>
               <a:ext uri="{FF2B5EF4-FFF2-40B4-BE49-F238E27FC236}">
-                <a16:creationId xmlns:a16="http://schemas.microsoft.com/office/drawing/2014/main" id="{C89C7A12-EB68-1A47-ABD5-665346F0FFD5}"/>
-              </a:ext>
-            </a:extLst>
-          </p:cNvPr>
-          <p:cNvPicPr>
-            <a:picLocks noChangeAspect="1"/>
-          </p:cNvPicPr>
-          <p:nvPr/>
-        </p:nvPicPr>
-        <p:blipFill rotWithShape="1">
-          <a:blip r:embed="rId2"/>
-          <a:srcRect l="1" t="50194" r="57437"/>
-          <a:stretch/>
-        </p:blipFill>
-        <p:spPr>
-          <a:xfrm>
-            <a:off x="9192229" y="2048586"/>
-            <a:ext cx="2972559" cy="1856833"/>
-          </a:xfrm>
-          <a:prstGeom prst="rect">
-            <a:avLst/>
-          </a:prstGeom>
-        </p:spPr>
-      </p:pic>
-      <p:pic>
-        <p:nvPicPr>
-          <p:cNvPr id="3" name="Picture 2">
-            <a:extLst>
-              <a:ext uri="{FF2B5EF4-FFF2-40B4-BE49-F238E27FC236}">
-                <a16:creationId xmlns:a16="http://schemas.microsoft.com/office/drawing/2014/main" id="{5EB189F0-2A17-BC48-8241-83850DE88612}"/>
+                <a16:creationId xmlns:a16="http://schemas.microsoft.com/office/drawing/2014/main" id="{393767A5-4305-BF4F-986D-C050C97AF50D}"/>
               </a:ext>
             </a:extLst>
           </p:cNvPr>
@@ -3047,13 +3018,13 @@
         </p:nvPicPr>
         <p:blipFill rotWithShape="1">
           <a:blip r:embed="rId3"/>
-          <a:srcRect r="15991"/>
+          <a:srcRect r="16063" b="50779"/>
           <a:stretch/>
         </p:blipFill>
         <p:spPr>
           <a:xfrm>
-            <a:off x="174956" y="177267"/>
-            <a:ext cx="5867085" cy="3728152"/>
+            <a:off x="5916824" y="63310"/>
+            <a:ext cx="6157336" cy="1927469"/>
           </a:xfrm>
           <a:prstGeom prst="rect">
             <a:avLst/>
@@ -3534,6 +3505,35 @@
           </p:style>
         </p:cxnSp>
       </p:grpSp>
+      <p:pic>
+        <p:nvPicPr>
+          <p:cNvPr id="20" name="Picture 19">
+            <a:extLst>
+              <a:ext uri="{FF2B5EF4-FFF2-40B4-BE49-F238E27FC236}">
+                <a16:creationId xmlns:a16="http://schemas.microsoft.com/office/drawing/2014/main" id="{9CD041E3-C128-8243-817D-ED9F1AE5C786}"/>
+              </a:ext>
+            </a:extLst>
+          </p:cNvPr>
+          <p:cNvPicPr>
+            <a:picLocks noChangeAspect="1"/>
+          </p:cNvPicPr>
+          <p:nvPr/>
+        </p:nvPicPr>
+        <p:blipFill rotWithShape="1">
+          <a:blip r:embed="rId3"/>
+          <a:srcRect t="50133" r="55939"/>
+          <a:stretch/>
+        </p:blipFill>
+        <p:spPr>
+          <a:xfrm>
+            <a:off x="8954081" y="2026485"/>
+            <a:ext cx="3232183" cy="1952780"/>
+          </a:xfrm>
+          <a:prstGeom prst="rect">
+            <a:avLst/>
+          </a:prstGeom>
+        </p:spPr>
+      </p:pic>
     </p:spTree>
     <p:extLst>
       <p:ext uri="{BB962C8B-B14F-4D97-AF65-F5344CB8AC3E}">

</xml_diff>